<commit_message>
Added fusion 360 project
The design of the mechanical case
</commit_message>
<xml_diff>
--- a/Solderingstation_powerpoint.pptx
+++ b/Solderingstation_powerpoint.pptx
@@ -8,10 +8,9 @@
     <p:sldId id="256" r:id="rId2"/>
     <p:sldId id="257" r:id="rId3"/>
     <p:sldId id="258" r:id="rId4"/>
-    <p:sldId id="259" r:id="rId5"/>
-    <p:sldId id="262" r:id="rId6"/>
-    <p:sldId id="263" r:id="rId7"/>
-    <p:sldId id="264" r:id="rId8"/>
+    <p:sldId id="262" r:id="rId5"/>
+    <p:sldId id="263" r:id="rId6"/>
+    <p:sldId id="264" r:id="rId7"/>
   </p:sldIdLst>
   <p:sldSz cx="12192000" cy="6858000"/>
   <p:notesSz cx="6858000" cy="9144000"/>
@@ -110,6 +109,11 @@
       </a:defRPr>
     </a:lvl9pPr>
   </p:defaultTextStyle>
+  <p:extLst>
+    <p:ext uri="{EFAFB233-063F-42B5-8137-9DF3F51BA10A}">
+      <p15:sldGuideLst xmlns:p15="http://schemas.microsoft.com/office/powerpoint/2012/main"/>
+    </p:ext>
+  </p:extLst>
 </p:presentation>
 </file>
 
@@ -330,7 +334,7 @@
           <a:p>
             <a:fld id="{9AB3A824-1A51-4B26-AD58-A6D8E14F6C04}" type="datetimeFigureOut">
               <a:rPr lang="en-US" dirty="0"/>
-              <a:t>6/5/2023</a:t>
+              <a:t>6/6/2023</a:t>
             </a:fld>
             <a:endParaRPr lang="en-US" dirty="0"/>
           </a:p>
@@ -664,7 +668,7 @@
           <a:p>
             <a:fld id="{D857E33E-8B18-4087-B112-809917729534}" type="datetimeFigureOut">
               <a:rPr lang="en-US" dirty="0"/>
-              <a:t>6/5/2023</a:t>
+              <a:t>6/6/2023</a:t>
             </a:fld>
             <a:endParaRPr lang="en-US" dirty="0"/>
           </a:p>
@@ -966,7 +970,7 @@
           <a:p>
             <a:fld id="{D3FFE419-2371-464F-8239-3959401C3561}" type="datetimeFigureOut">
               <a:rPr lang="en-US" dirty="0"/>
-              <a:t>6/5/2023</a:t>
+              <a:t>6/6/2023</a:t>
             </a:fld>
             <a:endParaRPr lang="en-US" dirty="0"/>
           </a:p>
@@ -1213,7 +1217,7 @@
           <a:p>
             <a:fld id="{97D162C4-EDD9-4389-A98B-B87ECEA2A816}" type="datetimeFigureOut">
               <a:rPr lang="en-US" dirty="0"/>
-              <a:t>6/5/2023</a:t>
+              <a:t>6/6/2023</a:t>
             </a:fld>
             <a:endParaRPr lang="en-US" dirty="0"/>
           </a:p>
@@ -1620,7 +1624,7 @@
           <a:p>
             <a:fld id="{3E5059C3-6A89-4494-99FF-5A4D6FFD50EB}" type="datetimeFigureOut">
               <a:rPr lang="en-US" dirty="0"/>
-              <a:t>6/5/2023</a:t>
+              <a:t>6/6/2023</a:t>
             </a:fld>
             <a:endParaRPr lang="en-US" dirty="0"/>
           </a:p>
@@ -1934,7 +1938,7 @@
           <a:p>
             <a:fld id="{CA954B2F-12DE-47F5-8894-472B206D2E1E}" type="datetimeFigureOut">
               <a:rPr lang="en-US" dirty="0"/>
-              <a:t>6/5/2023</a:t>
+              <a:t>6/6/2023</a:t>
             </a:fld>
             <a:endParaRPr lang="en-US" dirty="0"/>
           </a:p>
@@ -2478,7 +2482,7 @@
           <a:p>
             <a:fld id="{3F30E46F-7819-4ACF-B48B-48222C2ACC88}" type="datetimeFigureOut">
               <a:rPr lang="en-US" dirty="0"/>
-              <a:t>6/5/2023</a:t>
+              <a:t>6/6/2023</a:t>
             </a:fld>
             <a:endParaRPr lang="en-US" dirty="0"/>
           </a:p>
@@ -2673,7 +2677,7 @@
           <a:p>
             <a:fld id="{1FAF3416-4057-4DAA-829D-4CA07428D088}" type="datetimeFigureOut">
               <a:rPr lang="en-US" dirty="0"/>
-              <a:t>6/5/2023</a:t>
+              <a:t>6/6/2023</a:t>
             </a:fld>
             <a:endParaRPr lang="en-US" dirty="0"/>
           </a:p>
@@ -2886,7 +2890,7 @@
           <a:p>
             <a:fld id="{921D9284-D300-4297-87F7-E791DCC15DB1}" type="datetimeFigureOut">
               <a:rPr lang="en-US" dirty="0"/>
-              <a:t>6/5/2023</a:t>
+              <a:t>6/6/2023</a:t>
             </a:fld>
             <a:endParaRPr lang="en-US" dirty="0"/>
           </a:p>
@@ -3255,7 +3259,7 @@
           <a:p>
             <a:fld id="{37D525BB-DA17-4BA0-B3C8-3AC3ABC827E6}" type="datetimeFigureOut">
               <a:rPr lang="en-US" dirty="0"/>
-              <a:t>6/5/2023</a:t>
+              <a:t>6/6/2023</a:t>
             </a:fld>
             <a:endParaRPr lang="en-US" dirty="0"/>
           </a:p>
@@ -3658,7 +3662,7 @@
           <a:p>
             <a:fld id="{B16C4C9A-3960-41CF-A4E9-2A8FB932454B}" type="datetimeFigureOut">
               <a:rPr lang="en-US" dirty="0"/>
-              <a:t>6/5/2023</a:t>
+              <a:t>6/6/2023</a:t>
             </a:fld>
             <a:endParaRPr lang="en-US" dirty="0"/>
           </a:p>
@@ -3969,7 +3973,7 @@
           <a:p>
             <a:fld id="{3CBC1C18-307B-4F68-A007-B5B542270E8D}" type="datetimeFigureOut">
               <a:rPr lang="en-US" dirty="0"/>
-              <a:t>6/5/2023</a:t>
+              <a:t>6/6/2023</a:t>
             </a:fld>
             <a:endParaRPr lang="en-US" dirty="0"/>
           </a:p>
@@ -4561,7 +4565,7 @@
 </file>
 
 <file path=ppt/slides/slide2.xml><?xml version="1.0" encoding="utf-8"?>
-<p:sld xmlns:a="http://schemas.openxmlformats.org/drawingml/2006/main" xmlns:r="http://schemas.openxmlformats.org/officeDocument/2006/relationships" xmlns:p="http://schemas.openxmlformats.org/presentationml/2006/main">
+<p:sld xmlns:a="http://schemas.openxmlformats.org/drawingml/2006/main" xmlns:r="http://schemas.openxmlformats.org/officeDocument/2006/relationships" xmlns:p="http://schemas.openxmlformats.org/presentationml/2006/main" show="0">
   <p:cSld>
     <p:spTree>
       <p:nvGrpSpPr>
@@ -4717,7 +4721,12 @@
             <p:ph type="title"/>
           </p:nvPr>
         </p:nvSpPr>
-        <p:spPr/>
+        <p:spPr>
+          <a:xfrm>
+            <a:off x="2116834" y="2890385"/>
+            <a:ext cx="7958331" cy="1077229"/>
+          </a:xfrm>
+        </p:spPr>
         <p:txBody>
           <a:bodyPr/>
           <a:lstStyle/>
@@ -4727,31 +4736,6 @@
               <a:rPr lang="nl-BE" dirty="0" err="1"/>
               <a:t>Introduction</a:t>
             </a:r>
-            <a:endParaRPr lang="nl-BE" dirty="0"/>
-          </a:p>
-        </p:txBody>
-      </p:sp>
-      <p:sp>
-        <p:nvSpPr>
-          <p:cNvPr id="3" name="Tijdelijke aanduiding voor inhoud 2">
-            <a:extLst>
-              <a:ext uri="{FF2B5EF4-FFF2-40B4-BE49-F238E27FC236}">
-                <a16:creationId xmlns:a16="http://schemas.microsoft.com/office/drawing/2014/main" id="{F9C24C68-CB9B-0120-1BCB-D839876ED174}"/>
-              </a:ext>
-            </a:extLst>
-          </p:cNvPr>
-          <p:cNvSpPr>
-            <a:spLocks noGrp="1"/>
-          </p:cNvSpPr>
-          <p:nvPr>
-            <p:ph idx="1"/>
-          </p:nvPr>
-        </p:nvSpPr>
-        <p:spPr/>
-        <p:txBody>
-          <a:bodyPr/>
-          <a:lstStyle/>
-          <a:p>
             <a:endParaRPr lang="nl-BE" dirty="0"/>
           </a:p>
         </p:txBody>
@@ -4791,7 +4775,7 @@
           <p:cNvPr id="2" name="Titel 1">
             <a:extLst>
               <a:ext uri="{FF2B5EF4-FFF2-40B4-BE49-F238E27FC236}">
-                <a16:creationId xmlns:a16="http://schemas.microsoft.com/office/drawing/2014/main" id="{EA2C6E6D-3EF2-B976-BCAE-B5091B12DC59}"/>
+                <a16:creationId xmlns:a16="http://schemas.microsoft.com/office/drawing/2014/main" id="{C073FB05-3BAF-04AA-DCB7-32664C5A3B48}"/>
               </a:ext>
             </a:extLst>
           </p:cNvPr>
@@ -4815,15 +4799,7 @@
             <a:pPr algn="l"/>
             <a:r>
               <a:rPr lang="nl-BE" dirty="0"/>
-              <a:t>Libraries </a:t>
-            </a:r>
-            <a:r>
-              <a:rPr lang="nl-BE" dirty="0" err="1"/>
-              <a:t>and</a:t>
-            </a:r>
-            <a:r>
-              <a:rPr lang="nl-BE" dirty="0"/>
-              <a:t> Schematics</a:t>
+              <a:t>PCB design</a:t>
             </a:r>
           </a:p>
         </p:txBody>
@@ -4831,7 +4807,7 @@
     </p:spTree>
     <p:extLst>
       <p:ext uri="{BB962C8B-B14F-4D97-AF65-F5344CB8AC3E}">
-        <p14:creationId xmlns:p14="http://schemas.microsoft.com/office/powerpoint/2010/main" val="97152123"/>
+        <p14:creationId xmlns:p14="http://schemas.microsoft.com/office/powerpoint/2010/main" val="2717203330"/>
       </p:ext>
     </p:extLst>
   </p:cSld>
@@ -4887,7 +4863,7 @@
             <a:pPr algn="l"/>
             <a:r>
               <a:rPr lang="nl-BE" dirty="0"/>
-              <a:t>PCB design</a:t>
+              <a:t>Case design</a:t>
             </a:r>
           </a:p>
         </p:txBody>
@@ -4895,7 +4871,7 @@
     </p:spTree>
     <p:extLst>
       <p:ext uri="{BB962C8B-B14F-4D97-AF65-F5344CB8AC3E}">
-        <p14:creationId xmlns:p14="http://schemas.microsoft.com/office/powerpoint/2010/main" val="2717203330"/>
+        <p14:creationId xmlns:p14="http://schemas.microsoft.com/office/powerpoint/2010/main" val="3369539068"/>
       </p:ext>
     </p:extLst>
   </p:cSld>
@@ -4927,70 +4903,6 @@
           <p:cNvPr id="2" name="Titel 1">
             <a:extLst>
               <a:ext uri="{FF2B5EF4-FFF2-40B4-BE49-F238E27FC236}">
-                <a16:creationId xmlns:a16="http://schemas.microsoft.com/office/drawing/2014/main" id="{C073FB05-3BAF-04AA-DCB7-32664C5A3B48}"/>
-              </a:ext>
-            </a:extLst>
-          </p:cNvPr>
-          <p:cNvSpPr>
-            <a:spLocks noGrp="1"/>
-          </p:cNvSpPr>
-          <p:nvPr>
-            <p:ph type="title"/>
-          </p:nvPr>
-        </p:nvSpPr>
-        <p:spPr>
-          <a:xfrm>
-            <a:off x="2116834" y="2890385"/>
-            <a:ext cx="7958331" cy="1077229"/>
-          </a:xfrm>
-        </p:spPr>
-        <p:txBody>
-          <a:bodyPr/>
-          <a:lstStyle/>
-          <a:p>
-            <a:pPr algn="l"/>
-            <a:r>
-              <a:rPr lang="nl-BE" dirty="0"/>
-              <a:t>Case design</a:t>
-            </a:r>
-          </a:p>
-        </p:txBody>
-      </p:sp>
-    </p:spTree>
-    <p:extLst>
-      <p:ext uri="{BB962C8B-B14F-4D97-AF65-F5344CB8AC3E}">
-        <p14:creationId xmlns:p14="http://schemas.microsoft.com/office/powerpoint/2010/main" val="3369539068"/>
-      </p:ext>
-    </p:extLst>
-  </p:cSld>
-  <p:clrMapOvr>
-    <a:masterClrMapping/>
-  </p:clrMapOvr>
-</p:sld>
-</file>
-
-<file path=ppt/slides/slide7.xml><?xml version="1.0" encoding="utf-8"?>
-<p:sld xmlns:a="http://schemas.openxmlformats.org/drawingml/2006/main" xmlns:r="http://schemas.openxmlformats.org/officeDocument/2006/relationships" xmlns:p="http://schemas.openxmlformats.org/presentationml/2006/main">
-  <p:cSld>
-    <p:spTree>
-      <p:nvGrpSpPr>
-        <p:cNvPr id="1" name=""/>
-        <p:cNvGrpSpPr/>
-        <p:nvPr/>
-      </p:nvGrpSpPr>
-      <p:grpSpPr>
-        <a:xfrm>
-          <a:off x="0" y="0"/>
-          <a:ext cx="0" cy="0"/>
-          <a:chOff x="0" y="0"/>
-          <a:chExt cx="0" cy="0"/>
-        </a:xfrm>
-      </p:grpSpPr>
-      <p:sp>
-        <p:nvSpPr>
-          <p:cNvPr id="2" name="Titel 1">
-            <a:extLst>
-              <a:ext uri="{FF2B5EF4-FFF2-40B4-BE49-F238E27FC236}">
                 <a16:creationId xmlns:a16="http://schemas.microsoft.com/office/drawing/2014/main" id="{B9200B16-124E-D3A1-BF68-5511B18D84B6}"/>
               </a:ext>
             </a:extLst>
@@ -5002,7 +4914,12 @@
             <p:ph type="title"/>
           </p:nvPr>
         </p:nvSpPr>
-        <p:spPr/>
+        <p:spPr>
+          <a:xfrm>
+            <a:off x="2116834" y="2890385"/>
+            <a:ext cx="7958331" cy="1077229"/>
+          </a:xfrm>
+        </p:spPr>
         <p:txBody>
           <a:bodyPr/>
           <a:lstStyle/>
@@ -5015,34 +4932,6 @@
             <a:r>
               <a:rPr lang="nl-BE" dirty="0"/>
               <a:t> product</a:t>
-            </a:r>
-          </a:p>
-        </p:txBody>
-      </p:sp>
-      <p:sp>
-        <p:nvSpPr>
-          <p:cNvPr id="3" name="Tijdelijke aanduiding voor inhoud 2">
-            <a:extLst>
-              <a:ext uri="{FF2B5EF4-FFF2-40B4-BE49-F238E27FC236}">
-                <a16:creationId xmlns:a16="http://schemas.microsoft.com/office/drawing/2014/main" id="{5B6EC17D-3359-EA40-EE74-98BBEDD18E01}"/>
-              </a:ext>
-            </a:extLst>
-          </p:cNvPr>
-          <p:cNvSpPr>
-            <a:spLocks noGrp="1"/>
-          </p:cNvSpPr>
-          <p:nvPr>
-            <p:ph idx="1"/>
-          </p:nvPr>
-        </p:nvSpPr>
-        <p:spPr/>
-        <p:txBody>
-          <a:bodyPr/>
-          <a:lstStyle/>
-          <a:p>
-            <a:r>
-              <a:rPr lang="nl-BE" dirty="0"/>
-              <a:t>Demo</a:t>
             </a:r>
           </a:p>
         </p:txBody>

</xml_diff>